<commit_message>
Dont Really Remeber What I Did
</commit_message>
<xml_diff>
--- a/Folio/Design Brief RFID FINAL.pptx
+++ b/Folio/Design Brief RFID FINAL.pptx
@@ -135,13 +135,20 @@
       </p:ext>
     </p:extLst>
   </p:cmAuthor>
+  <p:cmAuthor id="2" name="sam drew" initials="sd" lastIdx="12" clrIdx="1">
+    <p:extLst>
+      <p:ext uri="{19B8F6BF-5375-455C-9EA6-DF929625EA0E}">
+        <p15:presenceInfo xmlns:p15="http://schemas.microsoft.com/office/powerpoint/2012/main" userId="066a4bc48ae62e81" providerId="Windows Live"/>
+      </p:ext>
+    </p:extLst>
+  </p:cmAuthor>
 </p:cmAuthorLst>
 </file>
 
 <file path=ppt/revisionInfo.xml><?xml version="1.0" encoding="utf-8"?>
 <p1510:revInfo xmlns:a="http://schemas.openxmlformats.org/drawingml/2006/main" xmlns:r="http://schemas.openxmlformats.org/officeDocument/2006/relationships" xmlns:p1510="http://schemas.microsoft.com/office/powerpoint/2015/10/main">
   <p1510:revLst>
-    <p1510:client id="{63F31B70-8B71-4811-9B45-C998EBFF8C4D}" v="1" dt="2020-03-26T11:58:53.822"/>
+    <p1510:client id="{63F31B70-8B71-4811-9B45-C998EBFF8C4D}" v="4" dt="2020-04-22T00:08:19.502"/>
   </p1510:revLst>
 </p1510:revInfo>
 </file>
@@ -150,19 +157,26 @@
 <pc:chgInfo xmlns:a="http://schemas.openxmlformats.org/drawingml/2006/main" xmlns:r="http://schemas.openxmlformats.org/officeDocument/2006/relationships" xmlns:ac="http://schemas.microsoft.com/office/drawing/2013/main/command" xmlns:pc="http://schemas.microsoft.com/office/powerpoint/2013/main/command">
   <pc:docChgLst>
     <pc:chgData name="Karna Amit" userId="512f0b414f2a6f27" providerId="LiveId" clId="{63F31B70-8B71-4811-9B45-C998EBFF8C4D}"/>
-    <pc:docChg chg="undo custSel modSld">
-      <pc:chgData name="Karna Amit" userId="512f0b414f2a6f27" providerId="LiveId" clId="{63F31B70-8B71-4811-9B45-C998EBFF8C4D}" dt="2020-03-27T12:06:50.094" v="6133" actId="20577"/>
+    <pc:docChg chg="custSel modSld">
+      <pc:chgData name="Karna Amit" userId="512f0b414f2a6f27" providerId="LiveId" clId="{63F31B70-8B71-4811-9B45-C998EBFF8C4D}" dt="2020-04-22T12:37:49.376" v="148" actId="5900"/>
       <pc:docMkLst>
         <pc:docMk/>
       </pc:docMkLst>
+      <pc:sldChg chg="delCm">
+        <pc:chgData name="Karna Amit" userId="512f0b414f2a6f27" providerId="LiveId" clId="{63F31B70-8B71-4811-9B45-C998EBFF8C4D}" dt="2020-04-22T00:07:21.411" v="1" actId="1592"/>
+        <pc:sldMkLst>
+          <pc:docMk/>
+          <pc:sldMk cId="2863815556" sldId="256"/>
+        </pc:sldMkLst>
+      </pc:sldChg>
       <pc:sldChg chg="modSp mod">
-        <pc:chgData name="Karna Amit" userId="512f0b414f2a6f27" providerId="LiveId" clId="{63F31B70-8B71-4811-9B45-C998EBFF8C4D}" dt="2020-03-26T12:25:32.760" v="1893" actId="20577"/>
+        <pc:chgData name="Karna Amit" userId="512f0b414f2a6f27" providerId="LiveId" clId="{63F31B70-8B71-4811-9B45-C998EBFF8C4D}" dt="2020-04-22T00:08:05.135" v="4" actId="207"/>
         <pc:sldMkLst>
           <pc:docMk/>
           <pc:sldMk cId="1530714256" sldId="257"/>
         </pc:sldMkLst>
         <pc:spChg chg="mod">
-          <ac:chgData name="Karna Amit" userId="512f0b414f2a6f27" providerId="LiveId" clId="{63F31B70-8B71-4811-9B45-C998EBFF8C4D}" dt="2020-03-26T12:25:32.760" v="1893" actId="20577"/>
+          <ac:chgData name="Karna Amit" userId="512f0b414f2a6f27" providerId="LiveId" clId="{63F31B70-8B71-4811-9B45-C998EBFF8C4D}" dt="2020-04-22T00:08:05.135" v="4" actId="207"/>
           <ac:spMkLst>
             <pc:docMk/>
             <pc:sldMk cId="1530714256" sldId="257"/>
@@ -171,13 +185,13 @@
         </pc:spChg>
       </pc:sldChg>
       <pc:sldChg chg="modSp mod">
-        <pc:chgData name="Karna Amit" userId="512f0b414f2a6f27" providerId="LiveId" clId="{63F31B70-8B71-4811-9B45-C998EBFF8C4D}" dt="2020-03-26T12:28:06.109" v="2418" actId="313"/>
+        <pc:chgData name="Karna Amit" userId="512f0b414f2a6f27" providerId="LiveId" clId="{63F31B70-8B71-4811-9B45-C998EBFF8C4D}" dt="2020-04-22T00:08:13.595" v="6" actId="207"/>
         <pc:sldMkLst>
           <pc:docMk/>
           <pc:sldMk cId="3667717409" sldId="258"/>
         </pc:sldMkLst>
         <pc:spChg chg="mod">
-          <ac:chgData name="Karna Amit" userId="512f0b414f2a6f27" providerId="LiveId" clId="{63F31B70-8B71-4811-9B45-C998EBFF8C4D}" dt="2020-03-26T12:28:06.109" v="2418" actId="313"/>
+          <ac:chgData name="Karna Amit" userId="512f0b414f2a6f27" providerId="LiveId" clId="{63F31B70-8B71-4811-9B45-C998EBFF8C4D}" dt="2020-04-22T00:08:13.595" v="6" actId="207"/>
           <ac:spMkLst>
             <pc:docMk/>
             <pc:sldMk cId="3667717409" sldId="258"/>
@@ -186,21 +200,13 @@
         </pc:spChg>
       </pc:sldChg>
       <pc:sldChg chg="modSp mod">
-        <pc:chgData name="Karna Amit" userId="512f0b414f2a6f27" providerId="LiveId" clId="{63F31B70-8B71-4811-9B45-C998EBFF8C4D}" dt="2020-03-26T12:32:09.949" v="2792" actId="33524"/>
+        <pc:chgData name="Karna Amit" userId="512f0b414f2a6f27" providerId="LiveId" clId="{63F31B70-8B71-4811-9B45-C998EBFF8C4D}" dt="2020-04-22T00:08:19.502" v="8" actId="207"/>
         <pc:sldMkLst>
           <pc:docMk/>
           <pc:sldMk cId="107519994" sldId="259"/>
         </pc:sldMkLst>
         <pc:spChg chg="mod">
-          <ac:chgData name="Karna Amit" userId="512f0b414f2a6f27" providerId="LiveId" clId="{63F31B70-8B71-4811-9B45-C998EBFF8C4D}" dt="2020-03-17T10:48:37.045" v="558" actId="1076"/>
-          <ac:spMkLst>
-            <pc:docMk/>
-            <pc:sldMk cId="107519994" sldId="259"/>
-            <ac:spMk id="2" creationId="{11373EE5-E27C-40DC-BCEF-F65A1A459131}"/>
-          </ac:spMkLst>
-        </pc:spChg>
-        <pc:spChg chg="mod">
-          <ac:chgData name="Karna Amit" userId="512f0b414f2a6f27" providerId="LiveId" clId="{63F31B70-8B71-4811-9B45-C998EBFF8C4D}" dt="2020-03-26T12:32:09.949" v="2792" actId="33524"/>
+          <ac:chgData name="Karna Amit" userId="512f0b414f2a6f27" providerId="LiveId" clId="{63F31B70-8B71-4811-9B45-C998EBFF8C4D}" dt="2020-04-22T00:08:19.502" v="8" actId="207"/>
           <ac:spMkLst>
             <pc:docMk/>
             <pc:sldMk cId="107519994" sldId="259"/>
@@ -208,164 +214,18 @@
           </ac:spMkLst>
         </pc:spChg>
       </pc:sldChg>
-      <pc:sldChg chg="modSp mod delCm">
-        <pc:chgData name="Karna Amit" userId="512f0b414f2a6f27" providerId="LiveId" clId="{63F31B70-8B71-4811-9B45-C998EBFF8C4D}" dt="2020-03-26T12:35:57.645" v="3474" actId="1592"/>
-        <pc:sldMkLst>
-          <pc:docMk/>
-          <pc:sldMk cId="2466430643" sldId="260"/>
-        </pc:sldMkLst>
-        <pc:spChg chg="mod">
-          <ac:chgData name="Karna Amit" userId="512f0b414f2a6f27" providerId="LiveId" clId="{63F31B70-8B71-4811-9B45-C998EBFF8C4D}" dt="2020-03-26T12:35:51.678" v="3473" actId="20577"/>
-          <ac:spMkLst>
-            <pc:docMk/>
-            <pc:sldMk cId="2466430643" sldId="260"/>
-            <ac:spMk id="3" creationId="{35BBF47D-7C95-462C-B283-886AF606A169}"/>
-          </ac:spMkLst>
-        </pc:spChg>
-      </pc:sldChg>
-      <pc:sldChg chg="modSp mod">
-        <pc:chgData name="Karna Amit" userId="512f0b414f2a6f27" providerId="LiveId" clId="{63F31B70-8B71-4811-9B45-C998EBFF8C4D}" dt="2020-03-26T12:37:07.518" v="3661" actId="20577"/>
+      <pc:sldChg chg="modSp mod modCm">
+        <pc:chgData name="Karna Amit" userId="512f0b414f2a6f27" providerId="LiveId" clId="{63F31B70-8B71-4811-9B45-C998EBFF8C4D}" dt="2020-04-22T12:37:49.376" v="148" actId="5900"/>
         <pc:sldMkLst>
           <pc:docMk/>
           <pc:sldMk cId="4002303717" sldId="261"/>
         </pc:sldMkLst>
         <pc:spChg chg="mod">
-          <ac:chgData name="Karna Amit" userId="512f0b414f2a6f27" providerId="LiveId" clId="{63F31B70-8B71-4811-9B45-C998EBFF8C4D}" dt="2020-03-26T12:37:07.518" v="3661" actId="20577"/>
+          <ac:chgData name="Karna Amit" userId="512f0b414f2a6f27" providerId="LiveId" clId="{63F31B70-8B71-4811-9B45-C998EBFF8C4D}" dt="2020-04-22T12:30:22.460" v="146" actId="20577"/>
           <ac:spMkLst>
             <pc:docMk/>
             <pc:sldMk cId="4002303717" sldId="261"/>
             <ac:spMk id="3" creationId="{F8D28276-DBE3-4E6D-A586-D7FB587646DF}"/>
-          </ac:spMkLst>
-        </pc:spChg>
-      </pc:sldChg>
-      <pc:sldChg chg="modSp mod">
-        <pc:chgData name="Karna Amit" userId="512f0b414f2a6f27" providerId="LiveId" clId="{63F31B70-8B71-4811-9B45-C998EBFF8C4D}" dt="2020-03-26T12:41:29.383" v="4227" actId="20577"/>
-        <pc:sldMkLst>
-          <pc:docMk/>
-          <pc:sldMk cId="2205271606" sldId="262"/>
-        </pc:sldMkLst>
-        <pc:spChg chg="mod">
-          <ac:chgData name="Karna Amit" userId="512f0b414f2a6f27" providerId="LiveId" clId="{63F31B70-8B71-4811-9B45-C998EBFF8C4D}" dt="2020-03-26T12:41:29.383" v="4227" actId="20577"/>
-          <ac:spMkLst>
-            <pc:docMk/>
-            <pc:sldMk cId="2205271606" sldId="262"/>
-            <ac:spMk id="3" creationId="{E203A206-2773-41FD-AF46-1A8DFE540502}"/>
-          </ac:spMkLst>
-        </pc:spChg>
-      </pc:sldChg>
-      <pc:sldChg chg="modSp mod">
-        <pc:chgData name="Karna Amit" userId="512f0b414f2a6f27" providerId="LiveId" clId="{63F31B70-8B71-4811-9B45-C998EBFF8C4D}" dt="2020-03-27T12:06:50.094" v="6133" actId="20577"/>
-        <pc:sldMkLst>
-          <pc:docMk/>
-          <pc:sldMk cId="798994191" sldId="263"/>
-        </pc:sldMkLst>
-        <pc:spChg chg="mod">
-          <ac:chgData name="Karna Amit" userId="512f0b414f2a6f27" providerId="LiveId" clId="{63F31B70-8B71-4811-9B45-C998EBFF8C4D}" dt="2020-03-27T12:06:50.094" v="6133" actId="20577"/>
-          <ac:spMkLst>
-            <pc:docMk/>
-            <pc:sldMk cId="798994191" sldId="263"/>
-            <ac:spMk id="3" creationId="{CF1B2A77-46DB-47C7-BC33-8CABADE40FF5}"/>
-          </ac:spMkLst>
-        </pc:spChg>
-      </pc:sldChg>
-      <pc:sldChg chg="modSp mod">
-        <pc:chgData name="Karna Amit" userId="512f0b414f2a6f27" providerId="LiveId" clId="{63F31B70-8B71-4811-9B45-C998EBFF8C4D}" dt="2020-03-27T11:10:37.308" v="5343" actId="1076"/>
-        <pc:sldMkLst>
-          <pc:docMk/>
-          <pc:sldMk cId="3032803118" sldId="264"/>
-        </pc:sldMkLst>
-        <pc:spChg chg="mod">
-          <ac:chgData name="Karna Amit" userId="512f0b414f2a6f27" providerId="LiveId" clId="{63F31B70-8B71-4811-9B45-C998EBFF8C4D}" dt="2020-03-27T11:10:37.308" v="5343" actId="1076"/>
-          <ac:spMkLst>
-            <pc:docMk/>
-            <pc:sldMk cId="3032803118" sldId="264"/>
-            <ac:spMk id="2" creationId="{EBEDCC09-582E-49A3-8D0F-0D2EF6306B39}"/>
-          </ac:spMkLst>
-        </pc:spChg>
-        <pc:spChg chg="mod">
-          <ac:chgData name="Karna Amit" userId="512f0b414f2a6f27" providerId="LiveId" clId="{63F31B70-8B71-4811-9B45-C998EBFF8C4D}" dt="2020-03-27T08:53:53.098" v="5342" actId="20577"/>
-          <ac:spMkLst>
-            <pc:docMk/>
-            <pc:sldMk cId="3032803118" sldId="264"/>
-            <ac:spMk id="3" creationId="{93A8FEF1-BC0D-41AC-88A8-A4896D7828A7}"/>
-          </ac:spMkLst>
-        </pc:spChg>
-      </pc:sldChg>
-    </pc:docChg>
-  </pc:docChgLst>
-  <pc:docChgLst>
-    <pc:chgData name="Karna Amit" userId="512f0b414f2a6f27" providerId="LiveId" clId="{0B86C9F0-3814-4815-92BF-23E12D18F18C}"/>
-    <pc:docChg chg="custSel modSld">
-      <pc:chgData name="Karna Amit" userId="512f0b414f2a6f27" providerId="LiveId" clId="{0B86C9F0-3814-4815-92BF-23E12D18F18C}" dt="2020-03-18T00:52:01.467" v="1036" actId="313"/>
-      <pc:docMkLst>
-        <pc:docMk/>
-      </pc:docMkLst>
-      <pc:sldChg chg="modSp mod delCm">
-        <pc:chgData name="Karna Amit" userId="512f0b414f2a6f27" providerId="LiveId" clId="{0B86C9F0-3814-4815-92BF-23E12D18F18C}" dt="2020-03-15T23:00:32.072" v="886" actId="20577"/>
-        <pc:sldMkLst>
-          <pc:docMk/>
-          <pc:sldMk cId="1530714256" sldId="257"/>
-        </pc:sldMkLst>
-        <pc:spChg chg="mod">
-          <ac:chgData name="Karna Amit" userId="512f0b414f2a6f27" providerId="LiveId" clId="{0B86C9F0-3814-4815-92BF-23E12D18F18C}" dt="2020-03-15T23:00:32.072" v="886" actId="20577"/>
-          <ac:spMkLst>
-            <pc:docMk/>
-            <pc:sldMk cId="1530714256" sldId="257"/>
-            <ac:spMk id="3" creationId="{8AF38D91-395E-4429-8B18-B575AB6D4F0B}"/>
-          </ac:spMkLst>
-        </pc:spChg>
-      </pc:sldChg>
-      <pc:sldChg chg="modSp mod">
-        <pc:chgData name="Karna Amit" userId="512f0b414f2a6f27" providerId="LiveId" clId="{0B86C9F0-3814-4815-92BF-23E12D18F18C}" dt="2020-03-15T23:03:52.885" v="1035" actId="20577"/>
-        <pc:sldMkLst>
-          <pc:docMk/>
-          <pc:sldMk cId="3667717409" sldId="258"/>
-        </pc:sldMkLst>
-        <pc:spChg chg="mod">
-          <ac:chgData name="Karna Amit" userId="512f0b414f2a6f27" providerId="LiveId" clId="{0B86C9F0-3814-4815-92BF-23E12D18F18C}" dt="2020-03-15T23:03:52.885" v="1035" actId="20577"/>
-          <ac:spMkLst>
-            <pc:docMk/>
-            <pc:sldMk cId="3667717409" sldId="258"/>
-            <ac:spMk id="6" creationId="{3DBC47F1-B446-479F-9938-1AF1500B948D}"/>
-          </ac:spMkLst>
-        </pc:spChg>
-      </pc:sldChg>
-      <pc:sldChg chg="modSp mod">
-        <pc:chgData name="Karna Amit" userId="512f0b414f2a6f27" providerId="LiveId" clId="{0B86C9F0-3814-4815-92BF-23E12D18F18C}" dt="2020-03-18T00:52:01.467" v="1036" actId="313"/>
-        <pc:sldMkLst>
-          <pc:docMk/>
-          <pc:sldMk cId="107519994" sldId="259"/>
-        </pc:sldMkLst>
-        <pc:spChg chg="mod">
-          <ac:chgData name="Karna Amit" userId="512f0b414f2a6f27" providerId="LiveId" clId="{0B86C9F0-3814-4815-92BF-23E12D18F18C}" dt="2020-03-18T00:52:01.467" v="1036" actId="313"/>
-          <ac:spMkLst>
-            <pc:docMk/>
-            <pc:sldMk cId="107519994" sldId="259"/>
-            <ac:spMk id="3" creationId="{63A38969-85DE-4C18-AA97-42E3AB275F87}"/>
-          </ac:spMkLst>
-        </pc:spChg>
-      </pc:sldChg>
-    </pc:docChg>
-  </pc:docChgLst>
-  <pc:docChgLst>
-    <pc:chgData name="Karna Amit" userId="512f0b414f2a6f27" providerId="LiveId" clId="{46C8A294-AB96-4F32-A233-CD8B7DED91E7}"/>
-    <pc:docChg chg="modSld">
-      <pc:chgData name="Karna Amit" userId="512f0b414f2a6f27" providerId="LiveId" clId="{46C8A294-AB96-4F32-A233-CD8B7DED91E7}" dt="2020-03-04T00:37:55.355" v="8" actId="1076"/>
-      <pc:docMkLst>
-        <pc:docMk/>
-      </pc:docMkLst>
-      <pc:sldChg chg="modSp mod">
-        <pc:chgData name="Karna Amit" userId="512f0b414f2a6f27" providerId="LiveId" clId="{46C8A294-AB96-4F32-A233-CD8B7DED91E7}" dt="2020-03-04T00:37:55.355" v="8" actId="1076"/>
-        <pc:sldMkLst>
-          <pc:docMk/>
-          <pc:sldMk cId="1530714256" sldId="257"/>
-        </pc:sldMkLst>
-        <pc:spChg chg="mod">
-          <ac:chgData name="Karna Amit" userId="512f0b414f2a6f27" providerId="LiveId" clId="{46C8A294-AB96-4F32-A233-CD8B7DED91E7}" dt="2020-03-04T00:37:55.355" v="8" actId="1076"/>
-          <ac:spMkLst>
-            <pc:docMk/>
-            <pc:sldMk cId="1530714256" sldId="257"/>
-            <ac:spMk id="3" creationId="{8AF38D91-395E-4429-8B18-B575AB6D4F0B}"/>
           </ac:spMkLst>
         </pc:spChg>
       </pc:sldChg>
@@ -376,12 +236,137 @@
 
 <file path=ppt/comments/comment1.xml><?xml version="1.0" encoding="utf-8"?>
 <p:cmLst xmlns:a="http://schemas.openxmlformats.org/drawingml/2006/main" xmlns:r="http://schemas.openxmlformats.org/officeDocument/2006/relationships" xmlns:p="http://schemas.openxmlformats.org/presentationml/2006/main">
-  <p:cm authorId="1" dt="2020-02-16T11:26:40.170" idx="4">
-    <p:pos x="5097" y="1664"/>
-    <p:text>Should I chuck in a slide thats just a introduction..?</p:text>
+  <p:cm authorId="2" dt="2020-04-22T07:11:42.843" idx="2">
+    <p:pos x="2304" y="232"/>
+    <p:text>Just proof your writing, but a really strong start.</p:text>
     <p:extLst>
       <p:ext uri="{C676402C-5697-4E1C-873F-D02D1690AC5C}">
-        <p15:threadingInfo xmlns:p15="http://schemas.microsoft.com/office/powerpoint/2012/main" timeZoneBias="-660"/>
+        <p15:threadingInfo xmlns:p15="http://schemas.microsoft.com/office/powerpoint/2012/main" timeZoneBias="-600"/>
+      </p:ext>
+    </p:extLst>
+  </p:cm>
+</p:cmLst>
+</file>
+
+<file path=ppt/comments/comment2.xml><?xml version="1.0" encoding="utf-8"?>
+<p:cmLst xmlns:a="http://schemas.openxmlformats.org/drawingml/2006/main" xmlns:r="http://schemas.openxmlformats.org/officeDocument/2006/relationships" xmlns:p="http://schemas.openxmlformats.org/presentationml/2006/main">
+  <p:cm authorId="2" dt="2020-04-22T07:14:42.857" idx="3">
+    <p:pos x="1339" y="201"/>
+    <p:text>This is concise and to the point, I like it.</p:text>
+    <p:extLst>
+      <p:ext uri="{C676402C-5697-4E1C-873F-D02D1690AC5C}">
+        <p15:threadingInfo xmlns:p15="http://schemas.microsoft.com/office/powerpoint/2012/main" timeZoneBias="-600"/>
+      </p:ext>
+    </p:extLst>
+  </p:cm>
+</p:cmLst>
+</file>
+
+<file path=ppt/comments/comment3.xml><?xml version="1.0" encoding="utf-8"?>
+<p:cmLst xmlns:a="http://schemas.openxmlformats.org/drawingml/2006/main" xmlns:r="http://schemas.openxmlformats.org/officeDocument/2006/relationships" xmlns:p="http://schemas.openxmlformats.org/presentationml/2006/main">
+  <p:cm authorId="2" dt="2020-04-22T07:16:23.300" idx="4">
+    <p:pos x="1395" y="271"/>
+    <p:text>This is generally ok, is there anything you can add that would give more direction to the project from Mr. Groff's perspective; timeframe, reliable system, safe and durable for longevity - for example.</p:text>
+    <p:extLst>
+      <p:ext uri="{C676402C-5697-4E1C-873F-D02D1690AC5C}">
+        <p15:threadingInfo xmlns:p15="http://schemas.microsoft.com/office/powerpoint/2012/main" timeZoneBias="-600"/>
+      </p:ext>
+    </p:extLst>
+  </p:cm>
+</p:cmLst>
+</file>
+
+<file path=ppt/comments/comment4.xml><?xml version="1.0" encoding="utf-8"?>
+<p:cmLst xmlns:a="http://schemas.openxmlformats.org/drawingml/2006/main" xmlns:r="http://schemas.openxmlformats.org/officeDocument/2006/relationships" xmlns:p="http://schemas.openxmlformats.org/presentationml/2006/main">
+  <p:cm authorId="2" dt="2020-04-22T07:19:40.310" idx="5">
+    <p:pos x="2068" y="347"/>
+    <p:text>This covers end users well, happy with this.</p:text>
+    <p:extLst>
+      <p:ext uri="{C676402C-5697-4E1C-873F-D02D1690AC5C}">
+        <p15:threadingInfo xmlns:p15="http://schemas.microsoft.com/office/powerpoint/2012/main" timeZoneBias="-600"/>
+      </p:ext>
+    </p:extLst>
+  </p:cm>
+</p:cmLst>
+</file>
+
+<file path=ppt/comments/comment5.xml><?xml version="1.0" encoding="utf-8"?>
+<p:cmLst xmlns:a="http://schemas.openxmlformats.org/drawingml/2006/main" xmlns:r="http://schemas.openxmlformats.org/officeDocument/2006/relationships" xmlns:p="http://schemas.openxmlformats.org/presentationml/2006/main">
+  <p:cm authorId="2" dt="2020-04-22T07:20:42.495" idx="6">
+    <p:pos x="10" y="10"/>
+    <p:text>Put a value on it, I know it is hard but have a target and see how close you get.</p:text>
+    <p:extLst>
+      <p:ext uri="{C676402C-5697-4E1C-873F-D02D1690AC5C}">
+        <p15:threadingInfo xmlns:p15="http://schemas.microsoft.com/office/powerpoint/2012/main" timeZoneBias="-600"/>
+      </p:ext>
+    </p:extLst>
+  </p:cm>
+  <p:cm authorId="2" dt="2020-04-22T07:21:37.025" idx="7">
+    <p:pos x="5124" y="1326"/>
+    <p:text>This is too general, be more specific, give general dimensions.</p:text>
+    <p:extLst>
+      <p:ext uri="{C676402C-5697-4E1C-873F-D02D1690AC5C}">
+        <p15:threadingInfo xmlns:p15="http://schemas.microsoft.com/office/powerpoint/2012/main" timeZoneBias="-600"/>
+      </p:ext>
+    </p:extLst>
+  </p:cm>
+  <p:cm authorId="2" dt="2020-04-22T07:22:36.922" idx="8">
+    <p:pos x="5919" y="2136"/>
+    <p:text>Perhaps look up worksafe for a safe load to work with and specifiy here.</p:text>
+    <p:extLst>
+      <p:ext uri="{C676402C-5697-4E1C-873F-D02D1690AC5C}">
+        <p15:threadingInfo xmlns:p15="http://schemas.microsoft.com/office/powerpoint/2012/main" timeZoneBias="-600"/>
+      </p:ext>
+    </p:extLst>
+  </p:cm>
+  <p:cm authorId="2" dt="2020-04-22T07:24:13.650" idx="9">
+    <p:pos x="146" y="146"/>
+    <p:text>Last three are general, but ok for now. Perhap hard to give specifications at this stage.</p:text>
+    <p:extLst>
+      <p:ext uri="{C676402C-5697-4E1C-873F-D02D1690AC5C}">
+        <p15:threadingInfo xmlns:p15="http://schemas.microsoft.com/office/powerpoint/2012/main" timeZoneBias="-600"/>
+      </p:ext>
+    </p:extLst>
+  </p:cm>
+</p:cmLst>
+</file>
+
+<file path=ppt/comments/comment6.xml><?xml version="1.0" encoding="utf-8"?>
+<p:cmLst xmlns:a="http://schemas.openxmlformats.org/drawingml/2006/main" xmlns:r="http://schemas.openxmlformats.org/officeDocument/2006/relationships" xmlns:p="http://schemas.openxmlformats.org/presentationml/2006/main">
+  <p:cm authorId="2" dt="2020-04-22T07:27:34.414" idx="10">
+    <p:pos x="10" y="10"/>
+    <p:text>This is well thought out.</p:text>
+    <p:extLst>
+      <p:ext uri="{C676402C-5697-4E1C-873F-D02D1690AC5C}">
+        <p15:threadingInfo xmlns:p15="http://schemas.microsoft.com/office/powerpoint/2012/main" timeZoneBias="-600"/>
+      </p:ext>
+    </p:extLst>
+  </p:cm>
+</p:cmLst>
+</file>
+
+<file path=ppt/comments/comment7.xml><?xml version="1.0" encoding="utf-8"?>
+<p:cmLst xmlns:a="http://schemas.openxmlformats.org/drawingml/2006/main" xmlns:r="http://schemas.openxmlformats.org/officeDocument/2006/relationships" xmlns:p="http://schemas.openxmlformats.org/presentationml/2006/main">
+  <p:cm authorId="2" dt="2020-04-22T07:29:04.635" idx="11">
+    <p:pos x="10" y="10"/>
+    <p:text>This is a good range of tests. The last one needs completing.</p:text>
+    <p:extLst>
+      <p:ext uri="{C676402C-5697-4E1C-873F-D02D1690AC5C}">
+        <p15:threadingInfo xmlns:p15="http://schemas.microsoft.com/office/powerpoint/2012/main" timeZoneBias="-600"/>
+      </p:ext>
+    </p:extLst>
+  </p:cm>
+</p:cmLst>
+</file>
+
+<file path=ppt/comments/comment8.xml><?xml version="1.0" encoding="utf-8"?>
+<p:cmLst xmlns:a="http://schemas.openxmlformats.org/drawingml/2006/main" xmlns:r="http://schemas.openxmlformats.org/officeDocument/2006/relationships" xmlns:p="http://schemas.openxmlformats.org/presentationml/2006/main">
+  <p:cm authorId="2" dt="2020-04-22T07:29:48.338" idx="12">
+    <p:pos x="10" y="10"/>
+    <p:text>This is also very detailed, great. It appears you have a clear sense of direction now.</p:text>
+    <p:extLst>
+      <p:ext uri="{C676402C-5697-4E1C-873F-D02D1690AC5C}">
+        <p15:threadingInfo xmlns:p15="http://schemas.microsoft.com/office/powerpoint/2012/main" timeZoneBias="-600"/>
       </p:ext>
     </p:extLst>
   </p:cm>
@@ -485,7 +470,7 @@
           <a:p>
             <a:fld id="{6EBBC747-2960-436F-864A-7A10A7B4DC4E}" type="datetimeFigureOut">
               <a:rPr lang="en-AU" smtClean="0"/>
-              <a:t>27/03/2020</a:t>
+              <a:t>22/04/2020</a:t>
             </a:fld>
             <a:endParaRPr lang="en-AU"/>
           </a:p>
@@ -669,7 +654,7 @@
           <a:p>
             <a:fld id="{7A8EDBA8-2926-40EE-8712-3CC94D24D01B}" type="datetimeFigureOut">
               <a:rPr lang="en-AU" smtClean="0"/>
-              <a:t>27/03/2020</a:t>
+              <a:t>22/04/2020</a:t>
             </a:fld>
             <a:endParaRPr lang="en-AU"/>
           </a:p>
@@ -1358,7 +1343,7 @@
           <a:p>
             <a:fld id="{ED176C11-203E-49ED-86D4-66E41C858C8F}" type="datetime1">
               <a:rPr lang="en-AU" smtClean="0"/>
-              <a:t>27/03/2020</a:t>
+              <a:t>22/04/2020</a:t>
             </a:fld>
             <a:endParaRPr lang="en-AU"/>
           </a:p>
@@ -1561,7 +1546,7 @@
           <a:p>
             <a:fld id="{14330129-87A2-468A-9691-17912D0CA255}" type="datetime1">
               <a:rPr lang="en-AU" smtClean="0"/>
-              <a:t>27/03/2020</a:t>
+              <a:t>22/04/2020</a:t>
             </a:fld>
             <a:endParaRPr lang="en-AU"/>
           </a:p>
@@ -1774,7 +1759,7 @@
           <a:p>
             <a:fld id="{CDE69C57-DECD-48FF-A711-7C5E684B94BB}" type="datetime1">
               <a:rPr lang="en-AU" smtClean="0"/>
-              <a:t>27/03/2020</a:t>
+              <a:t>22/04/2020</a:t>
             </a:fld>
             <a:endParaRPr lang="en-AU"/>
           </a:p>
@@ -1977,7 +1962,7 @@
           <a:p>
             <a:fld id="{0001CB84-DD54-4BA4-94BC-7725D08FBA1A}" type="datetime1">
               <a:rPr lang="en-AU" smtClean="0"/>
-              <a:t>27/03/2020</a:t>
+              <a:t>22/04/2020</a:t>
             </a:fld>
             <a:endParaRPr lang="en-AU"/>
           </a:p>
@@ -2256,7 +2241,7 @@
           <a:p>
             <a:fld id="{98F3250E-705D-4CF0-A5AB-9ACA3DB596D6}" type="datetime1">
               <a:rPr lang="en-AU" smtClean="0"/>
-              <a:t>27/03/2020</a:t>
+              <a:t>22/04/2020</a:t>
             </a:fld>
             <a:endParaRPr lang="en-AU"/>
           </a:p>
@@ -2527,7 +2512,7 @@
           <a:p>
             <a:fld id="{63286F58-D1FE-4A15-AB37-F59C95925BCD}" type="datetime1">
               <a:rPr lang="en-AU" smtClean="0"/>
-              <a:t>27/03/2020</a:t>
+              <a:t>22/04/2020</a:t>
             </a:fld>
             <a:endParaRPr lang="en-AU"/>
           </a:p>
@@ -2945,7 +2930,7 @@
           <a:p>
             <a:fld id="{711CC66B-061A-42D1-A3C5-20C620E9AE70}" type="datetime1">
               <a:rPr lang="en-AU" smtClean="0"/>
-              <a:t>27/03/2020</a:t>
+              <a:t>22/04/2020</a:t>
             </a:fld>
             <a:endParaRPr lang="en-AU"/>
           </a:p>
@@ -3090,7 +3075,7 @@
           <a:p>
             <a:fld id="{34F7C488-41B3-4B35-B6CE-042E79E55149}" type="datetime1">
               <a:rPr lang="en-AU" smtClean="0"/>
-              <a:t>27/03/2020</a:t>
+              <a:t>22/04/2020</a:t>
             </a:fld>
             <a:endParaRPr lang="en-AU"/>
           </a:p>
@@ -3206,7 +3191,7 @@
           <a:p>
             <a:fld id="{58EF828F-4844-49C3-A596-DCA869441585}" type="datetime1">
               <a:rPr lang="en-AU" smtClean="0"/>
-              <a:t>27/03/2020</a:t>
+              <a:t>22/04/2020</a:t>
             </a:fld>
             <a:endParaRPr lang="en-AU"/>
           </a:p>
@@ -3522,7 +3507,7 @@
           <a:p>
             <a:fld id="{E3161596-2B18-4FD2-BD81-49AEB14625A6}" type="datetime1">
               <a:rPr lang="en-AU" smtClean="0"/>
-              <a:t>27/03/2020</a:t>
+              <a:t>22/04/2020</a:t>
             </a:fld>
             <a:endParaRPr lang="en-AU"/>
           </a:p>
@@ -3814,7 +3799,7 @@
           <a:p>
             <a:fld id="{597C9C9A-EECE-4BF2-9074-9AEF9C820027}" type="datetime1">
               <a:rPr lang="en-AU" smtClean="0"/>
-              <a:t>27/03/2020</a:t>
+              <a:t>22/04/2020</a:t>
             </a:fld>
             <a:endParaRPr lang="en-AU"/>
           </a:p>
@@ -4060,7 +4045,7 @@
           <a:p>
             <a:fld id="{2B71CEB6-53EF-47A8-9702-2CB400CAF949}" type="datetime1">
               <a:rPr lang="en-AU" smtClean="0"/>
-              <a:t>27/03/2020</a:t>
+              <a:t>22/04/2020</a:t>
             </a:fld>
             <a:endParaRPr lang="en-AU"/>
           </a:p>
@@ -4638,7 +4623,7 @@
           <a:p>
             <a:r>
               <a:rPr lang="en-AU" dirty="0"/>
-              <a:t>Due to a recent push to make the schools IT infrastructure more robust, The Moordale Secondary school principal Mr Groff has decided build in a new IT &amp; Tech wing in the school to buy a bunch of new equipment and infrastructure to support the students learning. The first phase of the plan is underway and new improved equipment has been ordered and the IT department has started circulating the equipment, among which are laptops, </a:t>
+              <a:t>Due to a recent push to make the schools IT infrastructure more robust, The Moordale Secondary school principal Mr Groff has decided to build in a new IT &amp; Tech wing in the school to buy a bunch of new equipment and infrastructure to support the students learning. The first phase of the plan is underway and new improved equipment has been ordered and the IT department has started circulating the equipment, among which are laptops, </a:t>
             </a:r>
             <a:r>
               <a:rPr lang="en-AU" dirty="0" err="1"/>
@@ -4646,7 +4631,7 @@
             </a:r>
             <a:r>
               <a:rPr lang="en-AU" dirty="0"/>
-              <a:t>, computers etc. But the IT departments having a hard time keeping track of all this new equipment as it gets handed down to a large number of students especially in the junior school, as laptops gets misplaces and damaged and there is no reliable system in place to keep track of the equipment.</a:t>
+              <a:t>, computers etc. But the IT department is having a hard time keeping track of all this new equipment as it gets handed out to a large number of students especially in the junior school, as laptops get misplaced and damaged and there is no reliable system in place to keep track of the equipment.</a:t>
             </a:r>
           </a:p>
         </p:txBody>
@@ -4867,7 +4852,7 @@
             </a:pPr>
             <a:r>
               <a:rPr lang="en-AU" sz="2800" dirty="0"/>
-              <a:t>After much consideration it has been decided that a robust and modular administrative system needs to be developed and implemented into the classrooms and school as a whole. They system will need log every time a student or a member of staff checks out a device from the device bays located through out the school. The system will have to record identifying information about the entity using the device, the accurate date and time and the location of the device. All the data also needs to be stored safely with the database maintaining high industry standards regarding privacy of students and staff. </a:t>
+              <a:t>After much consideration it has been decided that a robust and modular administrative system needs to be developed and implemented into the classrooms and school as a whole. The system will need to log every time a student or a member of staff checks out a device from the device bays located through out the school. The system will have to record identifying information about the entity using the device, the accurate date and time and the location of the device. All the data also needs to be stored safely with the database maintaining high industry standards regarding privacy of students and staff. </a:t>
             </a:r>
           </a:p>
         </p:txBody>
@@ -4963,15 +4948,19 @@
           <a:p>
             <a:r>
               <a:rPr lang="en-AU" dirty="0"/>
-              <a:t>Mr. </a:t>
-            </a:r>
-            <a:r>
-              <a:rPr lang="en-AU" dirty="0" err="1"/>
-              <a:t>Micheal</a:t>
+              <a:t>Mr. Michael</a:t>
+            </a:r>
+            <a:r>
+              <a:rPr lang="en-AU" dirty="0">
+                <a:solidFill>
+                  <a:srgbClr val="FF0000"/>
+                </a:solidFill>
+              </a:rPr>
+              <a:t> </a:t>
             </a:r>
             <a:r>
               <a:rPr lang="en-AU" dirty="0"/>
-              <a:t> Groff is the principal of Moordale Secondary, he is an progressive man always looking for new things to improve the workflow of this staff and teacher. To that Mr Groff had decided that this new set of infrastructure and equipment will help to greatly improve in class efficiency of both the students and staff. He has personally invested a lot of time and effort into this program and would like it to succeed. </a:t>
+              <a:t>Groff is the principal of Moordale Secondary, he is an progressive man always looking for new things to improve the workflow of this staff and teacher. To that Mr Groff had decided that this new set of infrastructure and equipment will help to greatly improve in class efficiency of both the students and staff. He has personally invested a lot of time and effort into this program and would like it to succeed. </a:t>
             </a:r>
           </a:p>
         </p:txBody>
@@ -5281,25 +5270,25 @@
           <a:p>
             <a:r>
               <a:rPr lang="en-AU" dirty="0"/>
-              <a:t>Time: The system needs to be completed before the end of term 3</a:t>
+              <a:t>Time: The system needs to be completed before the end of term 3 Week 5</a:t>
             </a:r>
           </a:p>
           <a:p>
             <a:r>
               <a:rPr lang="en-AU" dirty="0"/>
-              <a:t>Cost:  Needs to fall below maximum budget of $___</a:t>
+              <a:t>Cost:  Needs to fall below maximum budget of $200</a:t>
             </a:r>
           </a:p>
           <a:p>
             <a:r>
               <a:rPr lang="en-AU" dirty="0"/>
-              <a:t>Size: The system needs to be sized reasonably</a:t>
+              <a:t>Size: The system needs to be sized as to fit as an accessory to most laptop bays already in circulation.</a:t>
             </a:r>
           </a:p>
           <a:p>
             <a:r>
               <a:rPr lang="en-AU" dirty="0"/>
-              <a:t>Weight: The system needs to be portable and easy to handle</a:t>
+              <a:t>Weight: The system needs to be portable and easy to handle, </a:t>
             </a:r>
           </a:p>
           <a:p>
@@ -5376,7 +5365,7 @@
           <a:lstStyle/>
           <a:p>
             <a:r>
-              <a:rPr lang="en-AU"/>
+              <a:rPr lang="en-AU" dirty="0"/>
               <a:t>Design Brief</a:t>
             </a:r>
           </a:p>
@@ -5619,6 +5608,14 @@
             <a:r>
               <a:rPr lang="en-US" b="1" u="sng" dirty="0"/>
               <a:t>Potential Test</a:t>
+            </a:r>
+            <a:r>
+              <a:rPr lang="en-US" b="1" u="sng" dirty="0">
+                <a:solidFill>
+                  <a:srgbClr val="FF0000"/>
+                </a:solidFill>
+              </a:rPr>
+              <a:t>s</a:t>
             </a:r>
             <a:br>
               <a:rPr lang="en-US" dirty="0"/>

</xml_diff>